<commit_message>
Small changes made in ppt
</commit_message>
<xml_diff>
--- a/Docs/Workshop_BigData.pptx
+++ b/Docs/Workshop_BigData.pptx
@@ -6366,6 +6366,46 @@
           </a:p>
         </p:txBody>
       </p:sp>
+      <p:sp>
+        <p:nvSpPr>
+          <p:cNvPr id="5" name="Slide Number Placeholder 3"/>
+          <p:cNvSpPr>
+            <a:spLocks noGrp="1"/>
+          </p:cNvSpPr>
+          <p:nvPr>
+            <p:ph type="sldNum" sz="quarter" idx="12"/>
+          </p:nvPr>
+        </p:nvSpPr>
+        <p:spPr>
+          <a:xfrm>
+            <a:off x="5198529" y="6233092"/>
+            <a:ext cx="683339" cy="365125"/>
+          </a:xfrm>
+        </p:spPr>
+        <p:txBody>
+          <a:bodyPr/>
+          <a:lstStyle/>
+          <a:p>
+            <a:fld id="{08BC291F-FE3A-4A5C-8AFF-A03132D736C4}" type="slidenum">
+              <a:rPr lang="en-US" sz="1800" smtClean="0">
+                <a:solidFill>
+                  <a:schemeClr val="tx1"/>
+                </a:solidFill>
+                <a:latin typeface="Times New Roman" panose="02020603050405020304" pitchFamily="18" charset="0"/>
+                <a:cs typeface="Times New Roman" panose="02020603050405020304" pitchFamily="18" charset="0"/>
+              </a:rPr>
+              <a:t>1</a:t>
+            </a:fld>
+            <a:endParaRPr lang="en-US" sz="1800" dirty="0">
+              <a:solidFill>
+                <a:schemeClr val="tx1"/>
+              </a:solidFill>
+              <a:latin typeface="Times New Roman" panose="02020603050405020304" pitchFamily="18" charset="0"/>
+              <a:cs typeface="Times New Roman" panose="02020603050405020304" pitchFamily="18" charset="0"/>
+            </a:endParaRPr>
+          </a:p>
+        </p:txBody>
+      </p:sp>
     </p:spTree>
     <p:extLst>
       <p:ext uri="{BB962C8B-B14F-4D97-AF65-F5344CB8AC3E}">
@@ -6568,6 +6608,46 @@
           </a:p>
         </p:txBody>
       </p:sp>
+      <p:sp>
+        <p:nvSpPr>
+          <p:cNvPr id="8" name="Slide Number Placeholder 3"/>
+          <p:cNvSpPr>
+            <a:spLocks noGrp="1"/>
+          </p:cNvSpPr>
+          <p:nvPr>
+            <p:ph type="sldNum" sz="quarter" idx="12"/>
+          </p:nvPr>
+        </p:nvSpPr>
+        <p:spPr>
+          <a:xfrm>
+            <a:off x="4697089" y="6263424"/>
+            <a:ext cx="683339" cy="365125"/>
+          </a:xfrm>
+        </p:spPr>
+        <p:txBody>
+          <a:bodyPr/>
+          <a:lstStyle/>
+          <a:p>
+            <a:fld id="{08BC291F-FE3A-4A5C-8AFF-A03132D736C4}" type="slidenum">
+              <a:rPr lang="en-US" sz="1800" smtClean="0">
+                <a:solidFill>
+                  <a:schemeClr val="tx1"/>
+                </a:solidFill>
+                <a:latin typeface="Times New Roman" panose="02020603050405020304" pitchFamily="18" charset="0"/>
+                <a:cs typeface="Times New Roman" panose="02020603050405020304" pitchFamily="18" charset="0"/>
+              </a:rPr>
+              <a:t>10</a:t>
+            </a:fld>
+            <a:endParaRPr lang="en-US" sz="1800" dirty="0">
+              <a:solidFill>
+                <a:schemeClr val="tx1"/>
+              </a:solidFill>
+              <a:latin typeface="Times New Roman" panose="02020603050405020304" pitchFamily="18" charset="0"/>
+              <a:cs typeface="Times New Roman" panose="02020603050405020304" pitchFamily="18" charset="0"/>
+            </a:endParaRPr>
+          </a:p>
+        </p:txBody>
+      </p:sp>
     </p:spTree>
     <p:extLst>
       <p:ext uri="{BB962C8B-B14F-4D97-AF65-F5344CB8AC3E}">
@@ -6769,6 +6849,46 @@
           </a:p>
         </p:txBody>
       </p:sp>
+      <p:sp>
+        <p:nvSpPr>
+          <p:cNvPr id="7" name="Slide Number Placeholder 3"/>
+          <p:cNvSpPr>
+            <a:spLocks noGrp="1"/>
+          </p:cNvSpPr>
+          <p:nvPr>
+            <p:ph type="sldNum" sz="quarter" idx="12"/>
+          </p:nvPr>
+        </p:nvSpPr>
+        <p:spPr>
+          <a:xfrm>
+            <a:off x="4975668" y="6263424"/>
+            <a:ext cx="683339" cy="365125"/>
+          </a:xfrm>
+        </p:spPr>
+        <p:txBody>
+          <a:bodyPr/>
+          <a:lstStyle/>
+          <a:p>
+            <a:fld id="{08BC291F-FE3A-4A5C-8AFF-A03132D736C4}" type="slidenum">
+              <a:rPr lang="en-US" sz="1800" smtClean="0">
+                <a:solidFill>
+                  <a:schemeClr val="tx1"/>
+                </a:solidFill>
+                <a:latin typeface="Times New Roman" panose="02020603050405020304" pitchFamily="18" charset="0"/>
+                <a:cs typeface="Times New Roman" panose="02020603050405020304" pitchFamily="18" charset="0"/>
+              </a:rPr>
+              <a:t>11</a:t>
+            </a:fld>
+            <a:endParaRPr lang="en-US" sz="1800" dirty="0">
+              <a:solidFill>
+                <a:schemeClr val="tx1"/>
+              </a:solidFill>
+              <a:latin typeface="Times New Roman" panose="02020603050405020304" pitchFamily="18" charset="0"/>
+              <a:cs typeface="Times New Roman" panose="02020603050405020304" pitchFamily="18" charset="0"/>
+            </a:endParaRPr>
+          </a:p>
+        </p:txBody>
+      </p:sp>
     </p:spTree>
     <p:extLst>
       <p:ext uri="{BB962C8B-B14F-4D97-AF65-F5344CB8AC3E}">
@@ -6942,6 +7062,46 @@
           </a:p>
         </p:txBody>
       </p:sp>
+      <p:sp>
+        <p:nvSpPr>
+          <p:cNvPr id="7" name="Slide Number Placeholder 3"/>
+          <p:cNvSpPr>
+            <a:spLocks noGrp="1"/>
+          </p:cNvSpPr>
+          <p:nvPr>
+            <p:ph type="sldNum" sz="quarter" idx="12"/>
+          </p:nvPr>
+        </p:nvSpPr>
+        <p:spPr>
+          <a:xfrm>
+            <a:off x="5080547" y="6263424"/>
+            <a:ext cx="683339" cy="365125"/>
+          </a:xfrm>
+        </p:spPr>
+        <p:txBody>
+          <a:bodyPr/>
+          <a:lstStyle/>
+          <a:p>
+            <a:fld id="{08BC291F-FE3A-4A5C-8AFF-A03132D736C4}" type="slidenum">
+              <a:rPr lang="en-US" sz="1800" smtClean="0">
+                <a:solidFill>
+                  <a:schemeClr val="tx1"/>
+                </a:solidFill>
+                <a:latin typeface="Times New Roman" panose="02020603050405020304" pitchFamily="18" charset="0"/>
+                <a:cs typeface="Times New Roman" panose="02020603050405020304" pitchFamily="18" charset="0"/>
+              </a:rPr>
+              <a:t>12</a:t>
+            </a:fld>
+            <a:endParaRPr lang="en-US" sz="1800" dirty="0">
+              <a:solidFill>
+                <a:schemeClr val="tx1"/>
+              </a:solidFill>
+              <a:latin typeface="Times New Roman" panose="02020603050405020304" pitchFamily="18" charset="0"/>
+              <a:cs typeface="Times New Roman" panose="02020603050405020304" pitchFamily="18" charset="0"/>
+            </a:endParaRPr>
+          </a:p>
+        </p:txBody>
+      </p:sp>
     </p:spTree>
     <p:extLst>
       <p:ext uri="{BB962C8B-B14F-4D97-AF65-F5344CB8AC3E}">
@@ -7118,6 +7278,46 @@
           </a:p>
         </p:txBody>
       </p:sp>
+      <p:sp>
+        <p:nvSpPr>
+          <p:cNvPr id="7" name="Slide Number Placeholder 3"/>
+          <p:cNvSpPr>
+            <a:spLocks noGrp="1"/>
+          </p:cNvSpPr>
+          <p:nvPr>
+            <p:ph type="sldNum" sz="quarter" idx="12"/>
+          </p:nvPr>
+        </p:nvSpPr>
+        <p:spPr>
+          <a:xfrm>
+            <a:off x="5124792" y="6263424"/>
+            <a:ext cx="683339" cy="365125"/>
+          </a:xfrm>
+        </p:spPr>
+        <p:txBody>
+          <a:bodyPr/>
+          <a:lstStyle/>
+          <a:p>
+            <a:fld id="{08BC291F-FE3A-4A5C-8AFF-A03132D736C4}" type="slidenum">
+              <a:rPr lang="en-US" sz="1800" smtClean="0">
+                <a:solidFill>
+                  <a:schemeClr val="tx1"/>
+                </a:solidFill>
+                <a:latin typeface="Times New Roman" panose="02020603050405020304" pitchFamily="18" charset="0"/>
+                <a:cs typeface="Times New Roman" panose="02020603050405020304" pitchFamily="18" charset="0"/>
+              </a:rPr>
+              <a:t>13</a:t>
+            </a:fld>
+            <a:endParaRPr lang="en-US" sz="1800" dirty="0">
+              <a:solidFill>
+                <a:schemeClr val="tx1"/>
+              </a:solidFill>
+              <a:latin typeface="Times New Roman" panose="02020603050405020304" pitchFamily="18" charset="0"/>
+              <a:cs typeface="Times New Roman" panose="02020603050405020304" pitchFamily="18" charset="0"/>
+            </a:endParaRPr>
+          </a:p>
+        </p:txBody>
+      </p:sp>
     </p:spTree>
     <p:extLst>
       <p:ext uri="{BB962C8B-B14F-4D97-AF65-F5344CB8AC3E}">
@@ -7312,6 +7512,98 @@
           </a:p>
         </p:txBody>
       </p:sp>
+      <p:sp>
+        <p:nvSpPr>
+          <p:cNvPr id="4" name="Google Shape;170;p26"/>
+          <p:cNvSpPr txBox="1"/>
+          <p:nvPr/>
+        </p:nvSpPr>
+        <p:spPr>
+          <a:xfrm>
+            <a:off x="9919250" y="6263424"/>
+            <a:ext cx="1891750" cy="442175"/>
+          </a:xfrm>
+          <a:prstGeom prst="rect">
+            <a:avLst/>
+          </a:prstGeom>
+          <a:noFill/>
+          <a:ln>
+            <a:noFill/>
+          </a:ln>
+        </p:spPr>
+        <p:txBody>
+          <a:bodyPr spcFirstLastPara="1" wrap="square" lIns="91425" tIns="91425" rIns="91425" bIns="91425" anchor="t" anchorCtr="0">
+            <a:noAutofit/>
+          </a:bodyPr>
+          <a:lstStyle/>
+          <a:p>
+            <a:pPr marL="0" lvl="0" indent="0" algn="l" rtl="0">
+              <a:spcBef>
+                <a:spcPts val="0"/>
+              </a:spcBef>
+              <a:spcAft>
+                <a:spcPts val="0"/>
+              </a:spcAft>
+              <a:buNone/>
+            </a:pPr>
+            <a:r>
+              <a:rPr lang="en" dirty="0" smtClean="0">
+                <a:latin typeface="Roboto"/>
+                <a:ea typeface="Roboto"/>
+                <a:cs typeface="Roboto"/>
+                <a:sym typeface="Roboto"/>
+              </a:rPr>
+              <a:t>Karthik Reddy</a:t>
+            </a:r>
+            <a:endParaRPr dirty="0">
+              <a:latin typeface="Roboto"/>
+              <a:ea typeface="Roboto"/>
+              <a:cs typeface="Roboto"/>
+              <a:sym typeface="Roboto"/>
+            </a:endParaRPr>
+          </a:p>
+        </p:txBody>
+      </p:sp>
+      <p:sp>
+        <p:nvSpPr>
+          <p:cNvPr id="7" name="Slide Number Placeholder 3"/>
+          <p:cNvSpPr>
+            <a:spLocks noGrp="1"/>
+          </p:cNvSpPr>
+          <p:nvPr>
+            <p:ph type="sldNum" sz="quarter" idx="12"/>
+          </p:nvPr>
+        </p:nvSpPr>
+        <p:spPr>
+          <a:xfrm>
+            <a:off x="5110043" y="6263424"/>
+            <a:ext cx="683339" cy="365125"/>
+          </a:xfrm>
+        </p:spPr>
+        <p:txBody>
+          <a:bodyPr/>
+          <a:lstStyle/>
+          <a:p>
+            <a:fld id="{08BC291F-FE3A-4A5C-8AFF-A03132D736C4}" type="slidenum">
+              <a:rPr lang="en-US" sz="1800" smtClean="0">
+                <a:solidFill>
+                  <a:schemeClr val="tx1"/>
+                </a:solidFill>
+                <a:latin typeface="Times New Roman" panose="02020603050405020304" pitchFamily="18" charset="0"/>
+                <a:cs typeface="Times New Roman" panose="02020603050405020304" pitchFamily="18" charset="0"/>
+              </a:rPr>
+              <a:t>14</a:t>
+            </a:fld>
+            <a:endParaRPr lang="en-US" sz="1800" dirty="0">
+              <a:solidFill>
+                <a:schemeClr val="tx1"/>
+              </a:solidFill>
+              <a:latin typeface="Times New Roman" panose="02020603050405020304" pitchFamily="18" charset="0"/>
+              <a:cs typeface="Times New Roman" panose="02020603050405020304" pitchFamily="18" charset="0"/>
+            </a:endParaRPr>
+          </a:p>
+        </p:txBody>
+      </p:sp>
     </p:spTree>
     <p:extLst>
       <p:ext uri="{BB962C8B-B14F-4D97-AF65-F5344CB8AC3E}">
@@ -7483,6 +7775,46 @@
           </a:p>
         </p:txBody>
       </p:sp>
+      <p:sp>
+        <p:nvSpPr>
+          <p:cNvPr id="7" name="Slide Number Placeholder 3"/>
+          <p:cNvSpPr>
+            <a:spLocks noGrp="1"/>
+          </p:cNvSpPr>
+          <p:nvPr>
+            <p:ph type="sldNum" sz="quarter" idx="12"/>
+          </p:nvPr>
+        </p:nvSpPr>
+        <p:spPr>
+          <a:xfrm>
+            <a:off x="4975668" y="6263424"/>
+            <a:ext cx="683339" cy="365125"/>
+          </a:xfrm>
+        </p:spPr>
+        <p:txBody>
+          <a:bodyPr/>
+          <a:lstStyle/>
+          <a:p>
+            <a:fld id="{08BC291F-FE3A-4A5C-8AFF-A03132D736C4}" type="slidenum">
+              <a:rPr lang="en-US" sz="1800" smtClean="0">
+                <a:solidFill>
+                  <a:schemeClr val="tx1"/>
+                </a:solidFill>
+                <a:latin typeface="Times New Roman" panose="02020603050405020304" pitchFamily="18" charset="0"/>
+                <a:cs typeface="Times New Roman" panose="02020603050405020304" pitchFamily="18" charset="0"/>
+              </a:rPr>
+              <a:t>15</a:t>
+            </a:fld>
+            <a:endParaRPr lang="en-US" sz="1800" dirty="0">
+              <a:solidFill>
+                <a:schemeClr val="tx1"/>
+              </a:solidFill>
+              <a:latin typeface="Times New Roman" panose="02020603050405020304" pitchFamily="18" charset="0"/>
+              <a:cs typeface="Times New Roman" panose="02020603050405020304" pitchFamily="18" charset="0"/>
+            </a:endParaRPr>
+          </a:p>
+        </p:txBody>
+      </p:sp>
     </p:spTree>
     <p:extLst>
       <p:ext uri="{BB962C8B-B14F-4D97-AF65-F5344CB8AC3E}">
@@ -7834,6 +8166,46 @@
               <a:ea typeface="Roboto"/>
               <a:cs typeface="Roboto"/>
               <a:sym typeface="Roboto"/>
+            </a:endParaRPr>
+          </a:p>
+        </p:txBody>
+      </p:sp>
+      <p:sp>
+        <p:nvSpPr>
+          <p:cNvPr id="8" name="Slide Number Placeholder 3"/>
+          <p:cNvSpPr>
+            <a:spLocks noGrp="1"/>
+          </p:cNvSpPr>
+          <p:nvPr>
+            <p:ph type="sldNum" sz="quarter" idx="12"/>
+          </p:nvPr>
+        </p:nvSpPr>
+        <p:spPr>
+          <a:xfrm>
+            <a:off x="4975668" y="6301948"/>
+            <a:ext cx="683339" cy="365125"/>
+          </a:xfrm>
+        </p:spPr>
+        <p:txBody>
+          <a:bodyPr/>
+          <a:lstStyle/>
+          <a:p>
+            <a:fld id="{08BC291F-FE3A-4A5C-8AFF-A03132D736C4}" type="slidenum">
+              <a:rPr lang="en-US" sz="1800" smtClean="0">
+                <a:solidFill>
+                  <a:schemeClr val="tx1"/>
+                </a:solidFill>
+                <a:latin typeface="Times New Roman" panose="02020603050405020304" pitchFamily="18" charset="0"/>
+                <a:cs typeface="Times New Roman" panose="02020603050405020304" pitchFamily="18" charset="0"/>
+              </a:rPr>
+              <a:t>16</a:t>
+            </a:fld>
+            <a:endParaRPr lang="en-US" sz="1800" dirty="0">
+              <a:solidFill>
+                <a:schemeClr val="tx1"/>
+              </a:solidFill>
+              <a:latin typeface="Times New Roman" panose="02020603050405020304" pitchFamily="18" charset="0"/>
+              <a:cs typeface="Times New Roman" panose="02020603050405020304" pitchFamily="18" charset="0"/>
             </a:endParaRPr>
           </a:p>
         </p:txBody>
@@ -7961,6 +8333,46 @@
           </a:p>
         </p:txBody>
       </p:sp>
+      <p:sp>
+        <p:nvSpPr>
+          <p:cNvPr id="6" name="Slide Number Placeholder 3"/>
+          <p:cNvSpPr>
+            <a:spLocks noGrp="1"/>
+          </p:cNvSpPr>
+          <p:nvPr>
+            <p:ph type="sldNum" sz="quarter" idx="12"/>
+          </p:nvPr>
+        </p:nvSpPr>
+        <p:spPr>
+          <a:xfrm>
+            <a:off x="5171993" y="6340474"/>
+            <a:ext cx="683339" cy="365125"/>
+          </a:xfrm>
+        </p:spPr>
+        <p:txBody>
+          <a:bodyPr/>
+          <a:lstStyle/>
+          <a:p>
+            <a:fld id="{08BC291F-FE3A-4A5C-8AFF-A03132D736C4}" type="slidenum">
+              <a:rPr lang="en-US" sz="1800" smtClean="0">
+                <a:solidFill>
+                  <a:schemeClr val="tx1"/>
+                </a:solidFill>
+                <a:latin typeface="Times New Roman" panose="02020603050405020304" pitchFamily="18" charset="0"/>
+                <a:cs typeface="Times New Roman" panose="02020603050405020304" pitchFamily="18" charset="0"/>
+              </a:rPr>
+              <a:t>17</a:t>
+            </a:fld>
+            <a:endParaRPr lang="en-US" sz="1800" dirty="0">
+              <a:solidFill>
+                <a:schemeClr val="tx1"/>
+              </a:solidFill>
+              <a:latin typeface="Times New Roman" panose="02020603050405020304" pitchFamily="18" charset="0"/>
+              <a:cs typeface="Times New Roman" panose="02020603050405020304" pitchFamily="18" charset="0"/>
+            </a:endParaRPr>
+          </a:p>
+        </p:txBody>
+      </p:sp>
     </p:spTree>
     <p:extLst>
       <p:ext uri="{BB962C8B-B14F-4D97-AF65-F5344CB8AC3E}">
@@ -8092,6 +8504,46 @@
               <a:solidFill>
                 <a:srgbClr val="00B0F0"/>
               </a:solidFill>
+            </a:endParaRPr>
+          </a:p>
+        </p:txBody>
+      </p:sp>
+      <p:sp>
+        <p:nvSpPr>
+          <p:cNvPr id="6" name="Slide Number Placeholder 3"/>
+          <p:cNvSpPr>
+            <a:spLocks noGrp="1"/>
+          </p:cNvSpPr>
+          <p:nvPr>
+            <p:ph type="sldNum" sz="quarter" idx="12"/>
+          </p:nvPr>
+        </p:nvSpPr>
+        <p:spPr>
+          <a:xfrm>
+            <a:off x="4975668" y="6295571"/>
+            <a:ext cx="683339" cy="365125"/>
+          </a:xfrm>
+        </p:spPr>
+        <p:txBody>
+          <a:bodyPr/>
+          <a:lstStyle/>
+          <a:p>
+            <a:fld id="{08BC291F-FE3A-4A5C-8AFF-A03132D736C4}" type="slidenum">
+              <a:rPr lang="en-US" sz="1800" smtClean="0">
+                <a:solidFill>
+                  <a:schemeClr val="tx1"/>
+                </a:solidFill>
+                <a:latin typeface="Times New Roman" panose="02020603050405020304" pitchFamily="18" charset="0"/>
+                <a:cs typeface="Times New Roman" panose="02020603050405020304" pitchFamily="18" charset="0"/>
+              </a:rPr>
+              <a:t>18</a:t>
+            </a:fld>
+            <a:endParaRPr lang="en-US" sz="1800" dirty="0">
+              <a:solidFill>
+                <a:schemeClr val="tx1"/>
+              </a:solidFill>
+              <a:latin typeface="Times New Roman" panose="02020603050405020304" pitchFamily="18" charset="0"/>
+              <a:cs typeface="Times New Roman" panose="02020603050405020304" pitchFamily="18" charset="0"/>
             </a:endParaRPr>
           </a:p>
         </p:txBody>
@@ -8167,6 +8619,46 @@
           </a:extLst>
         </p:spPr>
       </p:pic>
+      <p:sp>
+        <p:nvSpPr>
+          <p:cNvPr id="5" name="Slide Number Placeholder 3"/>
+          <p:cNvSpPr>
+            <a:spLocks noGrp="1"/>
+          </p:cNvSpPr>
+          <p:nvPr>
+            <p:ph type="sldNum" sz="quarter" idx="12"/>
+          </p:nvPr>
+        </p:nvSpPr>
+        <p:spPr>
+          <a:xfrm>
+            <a:off x="5640986" y="6445199"/>
+            <a:ext cx="683339" cy="365125"/>
+          </a:xfrm>
+        </p:spPr>
+        <p:txBody>
+          <a:bodyPr/>
+          <a:lstStyle/>
+          <a:p>
+            <a:fld id="{08BC291F-FE3A-4A5C-8AFF-A03132D736C4}" type="slidenum">
+              <a:rPr lang="en-US" sz="1800" smtClean="0">
+                <a:solidFill>
+                  <a:schemeClr val="tx1"/>
+                </a:solidFill>
+                <a:latin typeface="Times New Roman" panose="02020603050405020304" pitchFamily="18" charset="0"/>
+                <a:cs typeface="Times New Roman" panose="02020603050405020304" pitchFamily="18" charset="0"/>
+              </a:rPr>
+              <a:t>19</a:t>
+            </a:fld>
+            <a:endParaRPr lang="en-US" sz="1800" dirty="0">
+              <a:solidFill>
+                <a:schemeClr val="tx1"/>
+              </a:solidFill>
+              <a:latin typeface="Times New Roman" panose="02020603050405020304" pitchFamily="18" charset="0"/>
+              <a:cs typeface="Times New Roman" panose="02020603050405020304" pitchFamily="18" charset="0"/>
+            </a:endParaRPr>
+          </a:p>
+        </p:txBody>
+      </p:sp>
     </p:spTree>
     <p:extLst>
       <p:ext uri="{BB962C8B-B14F-4D97-AF65-F5344CB8AC3E}">
@@ -8437,6 +8929,46 @@
           </a:p>
         </p:txBody>
       </p:sp>
+      <p:sp>
+        <p:nvSpPr>
+          <p:cNvPr id="11" name="Slide Number Placeholder 3"/>
+          <p:cNvSpPr>
+            <a:spLocks noGrp="1"/>
+          </p:cNvSpPr>
+          <p:nvPr>
+            <p:ph type="sldNum" sz="quarter" idx="12"/>
+          </p:nvPr>
+        </p:nvSpPr>
+        <p:spPr>
+          <a:xfrm>
+            <a:off x="5419761" y="6492875"/>
+            <a:ext cx="683339" cy="365125"/>
+          </a:xfrm>
+        </p:spPr>
+        <p:txBody>
+          <a:bodyPr/>
+          <a:lstStyle/>
+          <a:p>
+            <a:fld id="{08BC291F-FE3A-4A5C-8AFF-A03132D736C4}" type="slidenum">
+              <a:rPr lang="en-US" sz="1800" smtClean="0">
+                <a:solidFill>
+                  <a:schemeClr val="tx1"/>
+                </a:solidFill>
+                <a:latin typeface="Times New Roman" panose="02020603050405020304" pitchFamily="18" charset="0"/>
+                <a:cs typeface="Times New Roman" panose="02020603050405020304" pitchFamily="18" charset="0"/>
+              </a:rPr>
+              <a:t>2</a:t>
+            </a:fld>
+            <a:endParaRPr lang="en-US" sz="1800" dirty="0">
+              <a:solidFill>
+                <a:schemeClr val="tx1"/>
+              </a:solidFill>
+              <a:latin typeface="Times New Roman" panose="02020603050405020304" pitchFamily="18" charset="0"/>
+              <a:cs typeface="Times New Roman" panose="02020603050405020304" pitchFamily="18" charset="0"/>
+            </a:endParaRPr>
+          </a:p>
+        </p:txBody>
+      </p:sp>
     </p:spTree>
     <p:extLst>
       <p:ext uri="{BB962C8B-B14F-4D97-AF65-F5344CB8AC3E}">
@@ -8647,6 +9179,46 @@
           </a:p>
         </p:txBody>
       </p:sp>
+      <p:sp>
+        <p:nvSpPr>
+          <p:cNvPr id="7" name="Slide Number Placeholder 3"/>
+          <p:cNvSpPr>
+            <a:spLocks noGrp="1"/>
+          </p:cNvSpPr>
+          <p:nvPr>
+            <p:ph type="sldNum" sz="quarter" idx="12"/>
+          </p:nvPr>
+        </p:nvSpPr>
+        <p:spPr>
+          <a:xfrm>
+            <a:off x="4975668" y="6263424"/>
+            <a:ext cx="683339" cy="365125"/>
+          </a:xfrm>
+        </p:spPr>
+        <p:txBody>
+          <a:bodyPr/>
+          <a:lstStyle/>
+          <a:p>
+            <a:fld id="{08BC291F-FE3A-4A5C-8AFF-A03132D736C4}" type="slidenum">
+              <a:rPr lang="en-US" sz="1800" smtClean="0">
+                <a:solidFill>
+                  <a:schemeClr val="tx1"/>
+                </a:solidFill>
+                <a:latin typeface="Times New Roman" panose="02020603050405020304" pitchFamily="18" charset="0"/>
+                <a:cs typeface="Times New Roman" panose="02020603050405020304" pitchFamily="18" charset="0"/>
+              </a:rPr>
+              <a:t>3</a:t>
+            </a:fld>
+            <a:endParaRPr lang="en-US" sz="1800" dirty="0">
+              <a:solidFill>
+                <a:schemeClr val="tx1"/>
+              </a:solidFill>
+              <a:latin typeface="Times New Roman" panose="02020603050405020304" pitchFamily="18" charset="0"/>
+              <a:cs typeface="Times New Roman" panose="02020603050405020304" pitchFamily="18" charset="0"/>
+            </a:endParaRPr>
+          </a:p>
+        </p:txBody>
+      </p:sp>
     </p:spTree>
     <p:extLst>
       <p:ext uri="{BB962C8B-B14F-4D97-AF65-F5344CB8AC3E}">
@@ -8857,6 +9429,46 @@
           </a:p>
         </p:txBody>
       </p:sp>
+      <p:sp>
+        <p:nvSpPr>
+          <p:cNvPr id="7" name="Slide Number Placeholder 3"/>
+          <p:cNvSpPr>
+            <a:spLocks noGrp="1"/>
+          </p:cNvSpPr>
+          <p:nvPr>
+            <p:ph type="sldNum" sz="quarter" idx="12"/>
+          </p:nvPr>
+        </p:nvSpPr>
+        <p:spPr>
+          <a:xfrm>
+            <a:off x="5110044" y="6263424"/>
+            <a:ext cx="683339" cy="365125"/>
+          </a:xfrm>
+        </p:spPr>
+        <p:txBody>
+          <a:bodyPr/>
+          <a:lstStyle/>
+          <a:p>
+            <a:fld id="{08BC291F-FE3A-4A5C-8AFF-A03132D736C4}" type="slidenum">
+              <a:rPr lang="en-US" sz="1800" smtClean="0">
+                <a:solidFill>
+                  <a:schemeClr val="tx1"/>
+                </a:solidFill>
+                <a:latin typeface="Times New Roman" panose="02020603050405020304" pitchFamily="18" charset="0"/>
+                <a:cs typeface="Times New Roman" panose="02020603050405020304" pitchFamily="18" charset="0"/>
+              </a:rPr>
+              <a:t>4</a:t>
+            </a:fld>
+            <a:endParaRPr lang="en-US" sz="1800" dirty="0">
+              <a:solidFill>
+                <a:schemeClr val="tx1"/>
+              </a:solidFill>
+              <a:latin typeface="Times New Roman" panose="02020603050405020304" pitchFamily="18" charset="0"/>
+              <a:cs typeface="Times New Roman" panose="02020603050405020304" pitchFamily="18" charset="0"/>
+            </a:endParaRPr>
+          </a:p>
+        </p:txBody>
+      </p:sp>
     </p:spTree>
     <p:extLst>
       <p:ext uri="{BB962C8B-B14F-4D97-AF65-F5344CB8AC3E}">
@@ -9064,6 +9676,46 @@
           </a:p>
         </p:txBody>
       </p:sp>
+      <p:sp>
+        <p:nvSpPr>
+          <p:cNvPr id="7" name="Slide Number Placeholder 3"/>
+          <p:cNvSpPr>
+            <a:spLocks noGrp="1"/>
+          </p:cNvSpPr>
+          <p:nvPr>
+            <p:ph type="sldNum" sz="quarter" idx="12"/>
+          </p:nvPr>
+        </p:nvSpPr>
+        <p:spPr>
+          <a:xfrm>
+            <a:off x="4633998" y="6257947"/>
+            <a:ext cx="683339" cy="365125"/>
+          </a:xfrm>
+        </p:spPr>
+        <p:txBody>
+          <a:bodyPr/>
+          <a:lstStyle/>
+          <a:p>
+            <a:fld id="{08BC291F-FE3A-4A5C-8AFF-A03132D736C4}" type="slidenum">
+              <a:rPr lang="en-US" sz="1800" smtClean="0">
+                <a:solidFill>
+                  <a:schemeClr val="tx1"/>
+                </a:solidFill>
+                <a:latin typeface="Times New Roman" panose="02020603050405020304" pitchFamily="18" charset="0"/>
+                <a:cs typeface="Times New Roman" panose="02020603050405020304" pitchFamily="18" charset="0"/>
+              </a:rPr>
+              <a:t>5</a:t>
+            </a:fld>
+            <a:endParaRPr lang="en-US" sz="1800" dirty="0">
+              <a:solidFill>
+                <a:schemeClr val="tx1"/>
+              </a:solidFill>
+              <a:latin typeface="Times New Roman" panose="02020603050405020304" pitchFamily="18" charset="0"/>
+              <a:cs typeface="Times New Roman" panose="02020603050405020304" pitchFamily="18" charset="0"/>
+            </a:endParaRPr>
+          </a:p>
+        </p:txBody>
+      </p:sp>
     </p:spTree>
     <p:extLst>
       <p:ext uri="{BB962C8B-B14F-4D97-AF65-F5344CB8AC3E}">
@@ -9511,6 +10163,46 @@
           </a:p>
         </p:txBody>
       </p:sp>
+      <p:sp>
+        <p:nvSpPr>
+          <p:cNvPr id="9" name="Slide Number Placeholder 3"/>
+          <p:cNvSpPr>
+            <a:spLocks noGrp="1"/>
+          </p:cNvSpPr>
+          <p:nvPr>
+            <p:ph type="sldNum" sz="quarter" idx="12"/>
+          </p:nvPr>
+        </p:nvSpPr>
+        <p:spPr>
+          <a:xfrm>
+            <a:off x="5154289" y="6287238"/>
+            <a:ext cx="683339" cy="365125"/>
+          </a:xfrm>
+        </p:spPr>
+        <p:txBody>
+          <a:bodyPr/>
+          <a:lstStyle/>
+          <a:p>
+            <a:fld id="{08BC291F-FE3A-4A5C-8AFF-A03132D736C4}" type="slidenum">
+              <a:rPr lang="en-US" sz="1800" smtClean="0">
+                <a:solidFill>
+                  <a:schemeClr val="tx1"/>
+                </a:solidFill>
+                <a:latin typeface="Times New Roman" panose="02020603050405020304" pitchFamily="18" charset="0"/>
+                <a:cs typeface="Times New Roman" panose="02020603050405020304" pitchFamily="18" charset="0"/>
+              </a:rPr>
+              <a:t>6</a:t>
+            </a:fld>
+            <a:endParaRPr lang="en-US" sz="1800" dirty="0">
+              <a:solidFill>
+                <a:schemeClr val="tx1"/>
+              </a:solidFill>
+              <a:latin typeface="Times New Roman" panose="02020603050405020304" pitchFamily="18" charset="0"/>
+              <a:cs typeface="Times New Roman" panose="02020603050405020304" pitchFamily="18" charset="0"/>
+            </a:endParaRPr>
+          </a:p>
+        </p:txBody>
+      </p:sp>
     </p:spTree>
     <p:extLst>
       <p:ext uri="{BB962C8B-B14F-4D97-AF65-F5344CB8AC3E}">
@@ -9956,6 +10648,46 @@
           </a:p>
         </p:txBody>
       </p:sp>
+      <p:sp>
+        <p:nvSpPr>
+          <p:cNvPr id="9" name="Slide Number Placeholder 3"/>
+          <p:cNvSpPr>
+            <a:spLocks noGrp="1"/>
+          </p:cNvSpPr>
+          <p:nvPr>
+            <p:ph type="sldNum" sz="quarter" idx="12"/>
+          </p:nvPr>
+        </p:nvSpPr>
+        <p:spPr>
+          <a:xfrm>
+            <a:off x="5037056" y="6252255"/>
+            <a:ext cx="683339" cy="365125"/>
+          </a:xfrm>
+        </p:spPr>
+        <p:txBody>
+          <a:bodyPr/>
+          <a:lstStyle/>
+          <a:p>
+            <a:fld id="{08BC291F-FE3A-4A5C-8AFF-A03132D736C4}" type="slidenum">
+              <a:rPr lang="en-US" sz="1800" smtClean="0">
+                <a:solidFill>
+                  <a:schemeClr val="tx1"/>
+                </a:solidFill>
+                <a:latin typeface="Times New Roman" panose="02020603050405020304" pitchFamily="18" charset="0"/>
+                <a:cs typeface="Times New Roman" panose="02020603050405020304" pitchFamily="18" charset="0"/>
+              </a:rPr>
+              <a:t>7</a:t>
+            </a:fld>
+            <a:endParaRPr lang="en-US" sz="1800" dirty="0">
+              <a:solidFill>
+                <a:schemeClr val="tx1"/>
+              </a:solidFill>
+              <a:latin typeface="Times New Roman" panose="02020603050405020304" pitchFamily="18" charset="0"/>
+              <a:cs typeface="Times New Roman" panose="02020603050405020304" pitchFamily="18" charset="0"/>
+            </a:endParaRPr>
+          </a:p>
+        </p:txBody>
+      </p:sp>
     </p:spTree>
     <p:extLst>
       <p:ext uri="{BB962C8B-B14F-4D97-AF65-F5344CB8AC3E}">
@@ -10561,6 +11293,46 @@
               <a:ea typeface="Roboto"/>
               <a:cs typeface="Roboto"/>
               <a:sym typeface="Roboto"/>
+            </a:endParaRPr>
+          </a:p>
+        </p:txBody>
+      </p:sp>
+      <p:sp>
+        <p:nvSpPr>
+          <p:cNvPr id="9" name="Slide Number Placeholder 3"/>
+          <p:cNvSpPr>
+            <a:spLocks noGrp="1"/>
+          </p:cNvSpPr>
+          <p:nvPr>
+            <p:ph type="sldNum" sz="quarter" idx="12"/>
+          </p:nvPr>
+        </p:nvSpPr>
+        <p:spPr>
+          <a:xfrm>
+            <a:off x="5037056" y="6263424"/>
+            <a:ext cx="683339" cy="365125"/>
+          </a:xfrm>
+        </p:spPr>
+        <p:txBody>
+          <a:bodyPr/>
+          <a:lstStyle/>
+          <a:p>
+            <a:fld id="{08BC291F-FE3A-4A5C-8AFF-A03132D736C4}" type="slidenum">
+              <a:rPr lang="en-US" sz="1800" smtClean="0">
+                <a:solidFill>
+                  <a:schemeClr val="tx1"/>
+                </a:solidFill>
+                <a:latin typeface="Times New Roman" panose="02020603050405020304" pitchFamily="18" charset="0"/>
+                <a:cs typeface="Times New Roman" panose="02020603050405020304" pitchFamily="18" charset="0"/>
+              </a:rPr>
+              <a:t>8</a:t>
+            </a:fld>
+            <a:endParaRPr lang="en-US" sz="1800" dirty="0">
+              <a:solidFill>
+                <a:schemeClr val="tx1"/>
+              </a:solidFill>
+              <a:latin typeface="Times New Roman" panose="02020603050405020304" pitchFamily="18" charset="0"/>
+              <a:cs typeface="Times New Roman" panose="02020603050405020304" pitchFamily="18" charset="0"/>
             </a:endParaRPr>
           </a:p>
         </p:txBody>
@@ -11007,6 +11779,46 @@
               <a:ea typeface="Roboto"/>
               <a:cs typeface="Roboto"/>
               <a:sym typeface="Roboto"/>
+            </a:endParaRPr>
+          </a:p>
+        </p:txBody>
+      </p:sp>
+      <p:sp>
+        <p:nvSpPr>
+          <p:cNvPr id="7" name="Slide Number Placeholder 3"/>
+          <p:cNvSpPr>
+            <a:spLocks noGrp="1"/>
+          </p:cNvSpPr>
+          <p:nvPr>
+            <p:ph type="sldNum" sz="quarter" idx="12"/>
+          </p:nvPr>
+        </p:nvSpPr>
+        <p:spPr>
+          <a:xfrm>
+            <a:off x="5460286" y="6374548"/>
+            <a:ext cx="683339" cy="365125"/>
+          </a:xfrm>
+        </p:spPr>
+        <p:txBody>
+          <a:bodyPr/>
+          <a:lstStyle/>
+          <a:p>
+            <a:fld id="{08BC291F-FE3A-4A5C-8AFF-A03132D736C4}" type="slidenum">
+              <a:rPr lang="en-US" sz="1800" smtClean="0">
+                <a:solidFill>
+                  <a:schemeClr val="tx1"/>
+                </a:solidFill>
+                <a:latin typeface="Times New Roman" panose="02020603050405020304" pitchFamily="18" charset="0"/>
+                <a:cs typeface="Times New Roman" panose="02020603050405020304" pitchFamily="18" charset="0"/>
+              </a:rPr>
+              <a:t>9</a:t>
+            </a:fld>
+            <a:endParaRPr lang="en-US" sz="1800" dirty="0">
+              <a:solidFill>
+                <a:schemeClr val="tx1"/>
+              </a:solidFill>
+              <a:latin typeface="Times New Roman" panose="02020603050405020304" pitchFamily="18" charset="0"/>
+              <a:cs typeface="Times New Roman" panose="02020603050405020304" pitchFamily="18" charset="0"/>
             </a:endParaRPr>
           </a:p>
         </p:txBody>

</xml_diff>